<commit_message>
Edit for showa exp
</commit_message>
<xml_diff>
--- a/static/shitsukan_app/img/exp_shitsukan_instruction.pptx
+++ b/static/shitsukan_app/img/exp_shitsukan_instruction.pptx
@@ -7,6 +7,8 @@
   <p:sldIdLst>
     <p:sldId id="256" r:id="rId2"/>
     <p:sldId id="257" r:id="rId3"/>
+    <p:sldId id="258" r:id="rId4"/>
+    <p:sldId id="259" r:id="rId5"/>
   </p:sldIdLst>
   <p:sldSz cx="12192000" cy="6858000"/>
   <p:notesSz cx="6858000" cy="9144000"/>
@@ -1329,7 +1331,7 @@
           <a:p>
             <a:fld id="{AC83974F-8A5A-4C6C-B7CA-D31FBAA77AC5}" type="datetimeFigureOut">
               <a:rPr kumimoji="1" lang="ja-JP" altLang="en-US" smtClean="0"/>
-              <a:t>2024/10/1</a:t>
+              <a:t>2024/10/11</a:t>
             </a:fld>
             <a:endParaRPr kumimoji="1" lang="ja-JP" altLang="en-US"/>
           </a:p>
@@ -1559,7 +1561,7 @@
           <a:p>
             <a:fld id="{AC83974F-8A5A-4C6C-B7CA-D31FBAA77AC5}" type="datetimeFigureOut">
               <a:rPr kumimoji="1" lang="ja-JP" altLang="en-US" smtClean="0"/>
-              <a:t>2024/10/1</a:t>
+              <a:t>2024/10/11</a:t>
             </a:fld>
             <a:endParaRPr kumimoji="1" lang="ja-JP" altLang="en-US"/>
           </a:p>
@@ -1799,7 +1801,7 @@
           <a:p>
             <a:fld id="{AC83974F-8A5A-4C6C-B7CA-D31FBAA77AC5}" type="datetimeFigureOut">
               <a:rPr kumimoji="1" lang="ja-JP" altLang="en-US" smtClean="0"/>
-              <a:t>2024/10/1</a:t>
+              <a:t>2024/10/11</a:t>
             </a:fld>
             <a:endParaRPr kumimoji="1" lang="ja-JP" altLang="en-US"/>
           </a:p>
@@ -2029,7 +2031,7 @@
           <a:p>
             <a:fld id="{AC83974F-8A5A-4C6C-B7CA-D31FBAA77AC5}" type="datetimeFigureOut">
               <a:rPr kumimoji="1" lang="ja-JP" altLang="en-US" smtClean="0"/>
-              <a:t>2024/10/1</a:t>
+              <a:t>2024/10/11</a:t>
             </a:fld>
             <a:endParaRPr kumimoji="1" lang="ja-JP" altLang="en-US"/>
           </a:p>
@@ -2304,7 +2306,7 @@
           <a:p>
             <a:fld id="{AC83974F-8A5A-4C6C-B7CA-D31FBAA77AC5}" type="datetimeFigureOut">
               <a:rPr kumimoji="1" lang="ja-JP" altLang="en-US" smtClean="0"/>
-              <a:t>2024/10/1</a:t>
+              <a:t>2024/10/11</a:t>
             </a:fld>
             <a:endParaRPr kumimoji="1" lang="ja-JP" altLang="en-US"/>
           </a:p>
@@ -2633,7 +2635,7 @@
           <a:p>
             <a:fld id="{AC83974F-8A5A-4C6C-B7CA-D31FBAA77AC5}" type="datetimeFigureOut">
               <a:rPr kumimoji="1" lang="ja-JP" altLang="en-US" smtClean="0"/>
-              <a:t>2024/10/1</a:t>
+              <a:t>2024/10/11</a:t>
             </a:fld>
             <a:endParaRPr kumimoji="1" lang="ja-JP" altLang="en-US"/>
           </a:p>
@@ -3109,7 +3111,7 @@
           <a:p>
             <a:fld id="{AC83974F-8A5A-4C6C-B7CA-D31FBAA77AC5}" type="datetimeFigureOut">
               <a:rPr kumimoji="1" lang="ja-JP" altLang="en-US" smtClean="0"/>
-              <a:t>2024/10/1</a:t>
+              <a:t>2024/10/11</a:t>
             </a:fld>
             <a:endParaRPr kumimoji="1" lang="ja-JP" altLang="en-US"/>
           </a:p>
@@ -3250,7 +3252,7 @@
           <a:p>
             <a:fld id="{AC83974F-8A5A-4C6C-B7CA-D31FBAA77AC5}" type="datetimeFigureOut">
               <a:rPr kumimoji="1" lang="ja-JP" altLang="en-US" smtClean="0"/>
-              <a:t>2024/10/1</a:t>
+              <a:t>2024/10/11</a:t>
             </a:fld>
             <a:endParaRPr kumimoji="1" lang="ja-JP" altLang="en-US"/>
           </a:p>
@@ -3363,7 +3365,7 @@
           <a:p>
             <a:fld id="{AC83974F-8A5A-4C6C-B7CA-D31FBAA77AC5}" type="datetimeFigureOut">
               <a:rPr kumimoji="1" lang="ja-JP" altLang="en-US" smtClean="0"/>
-              <a:t>2024/10/1</a:t>
+              <a:t>2024/10/11</a:t>
             </a:fld>
             <a:endParaRPr kumimoji="1" lang="ja-JP" altLang="en-US"/>
           </a:p>
@@ -3706,7 +3708,7 @@
           <a:p>
             <a:fld id="{AC83974F-8A5A-4C6C-B7CA-D31FBAA77AC5}" type="datetimeFigureOut">
               <a:rPr kumimoji="1" lang="ja-JP" altLang="en-US" smtClean="0"/>
-              <a:t>2024/10/1</a:t>
+              <a:t>2024/10/11</a:t>
             </a:fld>
             <a:endParaRPr kumimoji="1" lang="ja-JP" altLang="en-US"/>
           </a:p>
@@ -3994,7 +3996,7 @@
           <a:p>
             <a:fld id="{AC83974F-8A5A-4C6C-B7CA-D31FBAA77AC5}" type="datetimeFigureOut">
               <a:rPr kumimoji="1" lang="ja-JP" altLang="en-US" smtClean="0"/>
-              <a:t>2024/10/1</a:t>
+              <a:t>2024/10/11</a:t>
             </a:fld>
             <a:endParaRPr kumimoji="1" lang="ja-JP" altLang="en-US"/>
           </a:p>
@@ -4270,7 +4272,7 @@
           <a:p>
             <a:fld id="{AC83974F-8A5A-4C6C-B7CA-D31FBAA77AC5}" type="datetimeFigureOut">
               <a:rPr kumimoji="1" lang="ja-JP" altLang="en-US" smtClean="0"/>
-              <a:t>2024/10/1</a:t>
+              <a:t>2024/10/11</a:t>
             </a:fld>
             <a:endParaRPr kumimoji="1" lang="ja-JP" altLang="en-US"/>
           </a:p>
@@ -4965,7 +4967,7 @@
                 <a:ea typeface="メイリオ" panose="020B0604030504040204" pitchFamily="50" charset="-128"/>
                 <a:cs typeface="Helvetica" panose="020B0604020202020204" pitchFamily="34" charset="0"/>
               </a:rPr>
-              <a:t>つの物体画像のうち，ひとつだけ異なる材質の物体があります．その物体画像を画面タップで選択してください．</a:t>
+              <a:t>つの物体画像のうち，ひとつだけ異なる材質の物体があります．その物体画像をマウスクリックで選択してください．</a:t>
             </a:r>
             <a:endParaRPr lang="en-US" altLang="ja-JP" sz="2800" dirty="0">
               <a:solidFill>
@@ -4982,6 +4984,17 @@
               <a:buChar char="•"/>
             </a:pPr>
             <a:r>
+              <a:rPr lang="ja-JP" altLang="en-US" sz="2800" dirty="0">
+                <a:solidFill>
+                  <a:srgbClr val="1F3764"/>
+                </a:solidFill>
+                <a:latin typeface="メイリオ" panose="020B0604030504040204" pitchFamily="50" charset="-128"/>
+                <a:ea typeface="メイリオ" panose="020B0604030504040204" pitchFamily="50" charset="-128"/>
+                <a:cs typeface="Helvetica" panose="020B0604020202020204" pitchFamily="34" charset="0"/>
+              </a:rPr>
+              <a:t>画面が提示されてから</a:t>
+            </a:r>
+            <a:r>
               <a:rPr lang="en-US" altLang="ja-JP" sz="2800" dirty="0">
                 <a:solidFill>
                   <a:srgbClr val="1F3764"/>
@@ -4990,7 +5003,7 @@
                 <a:ea typeface="メイリオ" panose="020B0604030504040204" pitchFamily="50" charset="-128"/>
                 <a:cs typeface="Helvetica" panose="020B0604020202020204" pitchFamily="34" charset="0"/>
               </a:rPr>
-              <a:t>4</a:t>
+              <a:t>6</a:t>
             </a:r>
             <a:r>
               <a:rPr lang="ja-JP" altLang="en-US" sz="2800" dirty="0">
@@ -5001,7 +5014,98 @@
                 <a:ea typeface="メイリオ" panose="020B0604030504040204" pitchFamily="50" charset="-128"/>
                 <a:cs typeface="Helvetica" panose="020B0604020202020204" pitchFamily="34" charset="0"/>
               </a:rPr>
-              <a:t>つの物体画像はそれぞれ異なる向きで提示されますが，向きの違いは無視して材質の違いに注目して選択してください．</a:t>
+              <a:t>秒以内にクリックをして回答してください．</a:t>
+            </a:r>
+            <a:endParaRPr lang="en-US" altLang="ja-JP" sz="2800" dirty="0">
+              <a:solidFill>
+                <a:srgbClr val="1F3764"/>
+              </a:solidFill>
+              <a:latin typeface="メイリオ" panose="020B0604030504040204" pitchFamily="50" charset="-128"/>
+              <a:ea typeface="メイリオ" panose="020B0604030504040204" pitchFamily="50" charset="-128"/>
+              <a:cs typeface="Helvetica" panose="020B0604020202020204" pitchFamily="34" charset="0"/>
+            </a:endParaRPr>
+          </a:p>
+          <a:p>
+            <a:pPr marL="457200" indent="-457200">
+              <a:buFont typeface="Arial" panose="020B0604020202020204" pitchFamily="34" charset="0"/>
+              <a:buChar char="•"/>
+            </a:pPr>
+            <a:r>
+              <a:rPr lang="ja-JP" altLang="en-US" sz="2800" dirty="0">
+                <a:solidFill>
+                  <a:srgbClr val="1F3764"/>
+                </a:solidFill>
+                <a:latin typeface="メイリオ" panose="020B0604030504040204" pitchFamily="50" charset="-128"/>
+                <a:ea typeface="メイリオ" panose="020B0604030504040204" pitchFamily="50" charset="-128"/>
+                <a:cs typeface="Helvetica" panose="020B0604020202020204" pitchFamily="34" charset="0"/>
+              </a:rPr>
+              <a:t>実験全体は</a:t>
+            </a:r>
+            <a:r>
+              <a:rPr lang="en-US" altLang="ja-JP" sz="2800" dirty="0">
+                <a:solidFill>
+                  <a:srgbClr val="1F3764"/>
+                </a:solidFill>
+                <a:latin typeface="メイリオ" panose="020B0604030504040204" pitchFamily="50" charset="-128"/>
+                <a:ea typeface="メイリオ" panose="020B0604030504040204" pitchFamily="50" charset="-128"/>
+                <a:cs typeface="Helvetica" panose="020B0604020202020204" pitchFamily="34" charset="0"/>
+              </a:rPr>
+              <a:t>40</a:t>
+            </a:r>
+            <a:r>
+              <a:rPr lang="ja-JP" altLang="en-US" sz="2800" dirty="0">
+                <a:solidFill>
+                  <a:srgbClr val="1F3764"/>
+                </a:solidFill>
+                <a:latin typeface="メイリオ" panose="020B0604030504040204" pitchFamily="50" charset="-128"/>
+                <a:ea typeface="メイリオ" panose="020B0604030504040204" pitchFamily="50" charset="-128"/>
+                <a:cs typeface="Helvetica" panose="020B0604020202020204" pitchFamily="34" charset="0"/>
+              </a:rPr>
+              <a:t>試行の課題が</a:t>
+            </a:r>
+            <a:r>
+              <a:rPr lang="en-US" altLang="ja-JP" sz="2800" dirty="0">
+                <a:solidFill>
+                  <a:srgbClr val="1F3764"/>
+                </a:solidFill>
+                <a:latin typeface="メイリオ" panose="020B0604030504040204" pitchFamily="50" charset="-128"/>
+                <a:ea typeface="メイリオ" panose="020B0604030504040204" pitchFamily="50" charset="-128"/>
+                <a:cs typeface="Helvetica" panose="020B0604020202020204" pitchFamily="34" charset="0"/>
+              </a:rPr>
+              <a:t>8</a:t>
+            </a:r>
+            <a:r>
+              <a:rPr lang="ja-JP" altLang="en-US" sz="2800" dirty="0">
+                <a:solidFill>
+                  <a:srgbClr val="1F3764"/>
+                </a:solidFill>
+                <a:latin typeface="メイリオ" panose="020B0604030504040204" pitchFamily="50" charset="-128"/>
+                <a:ea typeface="メイリオ" panose="020B0604030504040204" pitchFamily="50" charset="-128"/>
+                <a:cs typeface="Helvetica" panose="020B0604020202020204" pitchFamily="34" charset="0"/>
+              </a:rPr>
+              <a:t>ブロックあります（合計</a:t>
+            </a:r>
+            <a:r>
+              <a:rPr lang="en-US" altLang="ja-JP" sz="2800" dirty="0">
+                <a:solidFill>
+                  <a:srgbClr val="1F3764"/>
+                </a:solidFill>
+                <a:latin typeface="メイリオ" panose="020B0604030504040204" pitchFamily="50" charset="-128"/>
+                <a:ea typeface="メイリオ" panose="020B0604030504040204" pitchFamily="50" charset="-128"/>
+                <a:cs typeface="Helvetica" panose="020B0604020202020204" pitchFamily="34" charset="0"/>
+              </a:rPr>
+              <a:t>320</a:t>
+            </a:r>
+            <a:r>
+              <a:rPr lang="ja-JP" altLang="en-US" sz="2800" dirty="0">
+                <a:solidFill>
+                  <a:srgbClr val="1F3764"/>
+                </a:solidFill>
+                <a:latin typeface="メイリオ" panose="020B0604030504040204" pitchFamily="50" charset="-128"/>
+                <a:ea typeface="メイリオ" panose="020B0604030504040204" pitchFamily="50" charset="-128"/>
+                <a:cs typeface="Helvetica" panose="020B0604020202020204" pitchFamily="34" charset="0"/>
+              </a:rPr>
+              <a:t>試行）．</a:t>
             </a:r>
             <a:endParaRPr lang="en-US" altLang="ja-JP" sz="2800" dirty="0">
               <a:solidFill>
@@ -5338,7 +5442,7 @@
         <p:spPr>
           <a:xfrm>
             <a:off x="143608" y="1247757"/>
-            <a:ext cx="11904784" cy="2246769"/>
+            <a:ext cx="11904784" cy="1815882"/>
           </a:xfrm>
           <a:prstGeom prst="rect">
             <a:avLst/>
@@ -5355,6 +5459,17 @@
               <a:buFont typeface="Arial" panose="020B0604020202020204" pitchFamily="34" charset="0"/>
               <a:buChar char="•"/>
             </a:pPr>
+            <a:r>
+              <a:rPr lang="en-US" altLang="ja-JP" sz="2800" dirty="0">
+                <a:solidFill>
+                  <a:srgbClr val="1F3764"/>
+                </a:solidFill>
+                <a:latin typeface="メイリオ" panose="020B0604030504040204" pitchFamily="50" charset="-128"/>
+                <a:ea typeface="メイリオ" panose="020B0604030504040204" pitchFamily="50" charset="-128"/>
+                <a:cs typeface="Helvetica" panose="020B0604020202020204" pitchFamily="34" charset="0"/>
+              </a:rPr>
+              <a:t>4</a:t>
+            </a:r>
             <a:r>
               <a:rPr lang="ja-JP" altLang="en-US" sz="2800" dirty="0">
                 <a:solidFill>
@@ -5364,19 +5479,22 @@
                 <a:ea typeface="メイリオ" panose="020B0604030504040204" pitchFamily="50" charset="-128"/>
                 <a:cs typeface="Helvetica" panose="020B0604020202020204" pitchFamily="34" charset="0"/>
               </a:rPr>
-              <a:t>画面を約</a:t>
-            </a:r>
-            <a:r>
-              <a:rPr lang="en-US" altLang="ja-JP" sz="2800" dirty="0">
-                <a:solidFill>
-                  <a:srgbClr val="1F3764"/>
-                </a:solidFill>
-                <a:latin typeface="メイリオ" panose="020B0604030504040204" pitchFamily="50" charset="-128"/>
-                <a:ea typeface="メイリオ" panose="020B0604030504040204" pitchFamily="50" charset="-128"/>
-                <a:cs typeface="Helvetica" panose="020B0604020202020204" pitchFamily="34" charset="0"/>
-              </a:rPr>
-              <a:t>30cm</a:t>
-            </a:r>
+              <a:t>つの物体画像はそれぞれ異なる向きで提示されますが，向きの違いは無視して材質の違いに注目して選択してください．</a:t>
+            </a:r>
+            <a:endParaRPr lang="en-US" altLang="ja-JP" sz="2800" dirty="0">
+              <a:solidFill>
+                <a:srgbClr val="1F3764"/>
+              </a:solidFill>
+              <a:latin typeface="メイリオ" panose="020B0604030504040204" pitchFamily="50" charset="-128"/>
+              <a:ea typeface="メイリオ" panose="020B0604030504040204" pitchFamily="50" charset="-128"/>
+              <a:cs typeface="Helvetica" panose="020B0604020202020204" pitchFamily="34" charset="0"/>
+            </a:endParaRPr>
+          </a:p>
+          <a:p>
+            <a:pPr marL="457200" indent="-457200">
+              <a:buFont typeface="Arial" panose="020B0604020202020204" pitchFamily="34" charset="0"/>
+              <a:buChar char="•"/>
+            </a:pPr>
             <a:r>
               <a:rPr lang="ja-JP" altLang="en-US" sz="2800" dirty="0">
                 <a:solidFill>
@@ -5386,171 +5504,8 @@
                 <a:ea typeface="メイリオ" panose="020B0604030504040204" pitchFamily="50" charset="-128"/>
                 <a:cs typeface="Helvetica" panose="020B0604020202020204" pitchFamily="34" charset="0"/>
               </a:rPr>
-              <a:t>離れた距離から観察して実験を行ってください．</a:t>
-            </a:r>
-            <a:endParaRPr lang="en-US" altLang="ja-JP" sz="2800" dirty="0">
-              <a:solidFill>
-                <a:srgbClr val="1F3764"/>
-              </a:solidFill>
-              <a:latin typeface="メイリオ" panose="020B0604030504040204" pitchFamily="50" charset="-128"/>
-              <a:ea typeface="メイリオ" panose="020B0604030504040204" pitchFamily="50" charset="-128"/>
-              <a:cs typeface="Helvetica" panose="020B0604020202020204" pitchFamily="34" charset="0"/>
-            </a:endParaRPr>
-          </a:p>
-          <a:p>
-            <a:pPr marL="457200" indent="-457200">
-              <a:buFont typeface="Arial" panose="020B0604020202020204" pitchFamily="34" charset="0"/>
-              <a:buChar char="•"/>
-            </a:pPr>
-            <a:endParaRPr lang="en-US" altLang="ja-JP" sz="2800" dirty="0">
-              <a:solidFill>
-                <a:srgbClr val="1F3764"/>
-              </a:solidFill>
-              <a:latin typeface="メイリオ" panose="020B0604030504040204" pitchFamily="50" charset="-128"/>
-              <a:ea typeface="メイリオ" panose="020B0604030504040204" pitchFamily="50" charset="-128"/>
-              <a:cs typeface="Helvetica" panose="020B0604020202020204" pitchFamily="34" charset="0"/>
-            </a:endParaRPr>
-          </a:p>
-          <a:p>
-            <a:pPr marL="457200" indent="-457200">
-              <a:buFont typeface="Arial" panose="020B0604020202020204" pitchFamily="34" charset="0"/>
-              <a:buChar char="•"/>
-            </a:pPr>
-            <a:r>
-              <a:rPr lang="ja-JP" altLang="en-US" sz="2800" dirty="0">
-                <a:solidFill>
-                  <a:srgbClr val="1F3764"/>
-                </a:solidFill>
-                <a:latin typeface="メイリオ" panose="020B0604030504040204" pitchFamily="50" charset="-128"/>
-                <a:ea typeface="メイリオ" panose="020B0604030504040204" pitchFamily="50" charset="-128"/>
-                <a:cs typeface="Helvetica" panose="020B0604020202020204" pitchFamily="34" charset="0"/>
-              </a:rPr>
-              <a:t>実験全体は</a:t>
-            </a:r>
-            <a:r>
-              <a:rPr lang="en-US" altLang="ja-JP" sz="2800" dirty="0">
-                <a:solidFill>
-                  <a:srgbClr val="1F3764"/>
-                </a:solidFill>
-                <a:latin typeface="メイリオ" panose="020B0604030504040204" pitchFamily="50" charset="-128"/>
-                <a:ea typeface="メイリオ" panose="020B0604030504040204" pitchFamily="50" charset="-128"/>
-                <a:cs typeface="Helvetica" panose="020B0604020202020204" pitchFamily="34" charset="0"/>
-              </a:rPr>
-              <a:t>80</a:t>
-            </a:r>
-            <a:r>
-              <a:rPr lang="ja-JP" altLang="en-US" sz="2800" dirty="0">
-                <a:solidFill>
-                  <a:srgbClr val="1F3764"/>
-                </a:solidFill>
-                <a:latin typeface="メイリオ" panose="020B0604030504040204" pitchFamily="50" charset="-128"/>
-                <a:ea typeface="メイリオ" panose="020B0604030504040204" pitchFamily="50" charset="-128"/>
-                <a:cs typeface="Helvetica" panose="020B0604020202020204" pitchFamily="34" charset="0"/>
-              </a:rPr>
-              <a:t>試行の課題が</a:t>
-            </a:r>
-            <a:r>
-              <a:rPr lang="en-US" altLang="ja-JP" sz="2800" dirty="0">
-                <a:solidFill>
-                  <a:srgbClr val="1F3764"/>
-                </a:solidFill>
-                <a:latin typeface="メイリオ" panose="020B0604030504040204" pitchFamily="50" charset="-128"/>
-                <a:ea typeface="メイリオ" panose="020B0604030504040204" pitchFamily="50" charset="-128"/>
-                <a:cs typeface="Helvetica" panose="020B0604020202020204" pitchFamily="34" charset="0"/>
-              </a:rPr>
-              <a:t>5</a:t>
-            </a:r>
-            <a:r>
-              <a:rPr lang="ja-JP" altLang="en-US" sz="2800" dirty="0">
-                <a:solidFill>
-                  <a:srgbClr val="1F3764"/>
-                </a:solidFill>
-                <a:latin typeface="メイリオ" panose="020B0604030504040204" pitchFamily="50" charset="-128"/>
-                <a:ea typeface="メイリオ" panose="020B0604030504040204" pitchFamily="50" charset="-128"/>
-                <a:cs typeface="Helvetica" panose="020B0604020202020204" pitchFamily="34" charset="0"/>
-              </a:rPr>
-              <a:t>ブロックあります</a:t>
-            </a:r>
-            <a:r>
-              <a:rPr lang="en-US" altLang="ja-JP" sz="2800" dirty="0">
-                <a:solidFill>
-                  <a:srgbClr val="1F3764"/>
-                </a:solidFill>
-                <a:latin typeface="メイリオ" panose="020B0604030504040204" pitchFamily="50" charset="-128"/>
-                <a:ea typeface="メイリオ" panose="020B0604030504040204" pitchFamily="50" charset="-128"/>
-                <a:cs typeface="Helvetica" panose="020B0604020202020204" pitchFamily="34" charset="0"/>
-              </a:rPr>
-              <a:t>(</a:t>
-            </a:r>
-            <a:r>
-              <a:rPr lang="ja-JP" altLang="en-US" sz="2800" dirty="0">
-                <a:solidFill>
-                  <a:srgbClr val="1F3764"/>
-                </a:solidFill>
-                <a:latin typeface="メイリオ" panose="020B0604030504040204" pitchFamily="50" charset="-128"/>
-                <a:ea typeface="メイリオ" panose="020B0604030504040204" pitchFamily="50" charset="-128"/>
-                <a:cs typeface="Helvetica" panose="020B0604020202020204" pitchFamily="34" charset="0"/>
-              </a:rPr>
-              <a:t>合計</a:t>
-            </a:r>
-            <a:r>
-              <a:rPr lang="en-US" altLang="ja-JP" sz="2800" dirty="0">
-                <a:solidFill>
-                  <a:srgbClr val="1F3764"/>
-                </a:solidFill>
-                <a:latin typeface="メイリオ" panose="020B0604030504040204" pitchFamily="50" charset="-128"/>
-                <a:ea typeface="メイリオ" panose="020B0604030504040204" pitchFamily="50" charset="-128"/>
-                <a:cs typeface="Helvetica" panose="020B0604020202020204" pitchFamily="34" charset="0"/>
-              </a:rPr>
-              <a:t>400</a:t>
-            </a:r>
-            <a:r>
-              <a:rPr lang="ja-JP" altLang="en-US" sz="2800" dirty="0">
-                <a:solidFill>
-                  <a:srgbClr val="1F3764"/>
-                </a:solidFill>
-                <a:latin typeface="メイリオ" panose="020B0604030504040204" pitchFamily="50" charset="-128"/>
-                <a:ea typeface="メイリオ" panose="020B0604030504040204" pitchFamily="50" charset="-128"/>
-                <a:cs typeface="Helvetica" panose="020B0604020202020204" pitchFamily="34" charset="0"/>
-              </a:rPr>
-              <a:t>試行</a:t>
-            </a:r>
-            <a:r>
-              <a:rPr lang="en-US" altLang="ja-JP" sz="2800" dirty="0">
-                <a:solidFill>
-                  <a:srgbClr val="1F3764"/>
-                </a:solidFill>
-                <a:latin typeface="メイリオ" panose="020B0604030504040204" pitchFamily="50" charset="-128"/>
-                <a:ea typeface="メイリオ" panose="020B0604030504040204" pitchFamily="50" charset="-128"/>
-                <a:cs typeface="Helvetica" panose="020B0604020202020204" pitchFamily="34" charset="0"/>
-              </a:rPr>
-              <a:t>)</a:t>
-            </a:r>
-            <a:r>
-              <a:rPr lang="ja-JP" altLang="en-US" sz="2800" dirty="0">
-                <a:solidFill>
-                  <a:srgbClr val="1F3764"/>
-                </a:solidFill>
-                <a:latin typeface="メイリオ" panose="020B0604030504040204" pitchFamily="50" charset="-128"/>
-                <a:ea typeface="メイリオ" panose="020B0604030504040204" pitchFamily="50" charset="-128"/>
-                <a:cs typeface="Helvetica" panose="020B0604020202020204" pitchFamily="34" charset="0"/>
-              </a:rPr>
-              <a:t>．</a:t>
-            </a:r>
-            <a:endParaRPr lang="en-US" altLang="ja-JP" sz="2800" dirty="0">
-              <a:solidFill>
-                <a:srgbClr val="1F3764"/>
-              </a:solidFill>
-              <a:latin typeface="メイリオ" panose="020B0604030504040204" pitchFamily="50" charset="-128"/>
-              <a:ea typeface="メイリオ" panose="020B0604030504040204" pitchFamily="50" charset="-128"/>
-              <a:cs typeface="Helvetica" panose="020B0604020202020204" pitchFamily="34" charset="0"/>
-            </a:endParaRPr>
-          </a:p>
-          <a:p>
-            <a:pPr marL="457200" indent="-457200">
-              <a:buFont typeface="Arial" panose="020B0604020202020204" pitchFamily="34" charset="0"/>
-              <a:buChar char="•"/>
-            </a:pPr>
+              <a:t>課題は非常に難しいものから簡単なものまで様々な難易度があります．</a:t>
+            </a:r>
             <a:endParaRPr lang="en-US" altLang="ja-JP" sz="2800" dirty="0">
               <a:solidFill>
                 <a:srgbClr val="1F3764"/>
@@ -5588,7 +5543,7 @@
               <a:t>Start</a:t>
             </a:r>
             <a:r>
-              <a:rPr lang="ja-JP" altLang="en-US" sz="2800">
+              <a:rPr lang="ja-JP" altLang="en-US" sz="2800" dirty="0">
                 <a:solidFill>
                   <a:srgbClr val="1F3764"/>
                 </a:solidFill>
@@ -5596,7 +5551,7 @@
                 <a:ea typeface="メイリオ" panose="020B0604030504040204" pitchFamily="50" charset="-128"/>
                 <a:cs typeface="Helvetica" panose="020B0604020202020204" pitchFamily="34" charset="0"/>
               </a:rPr>
-              <a:t>ボタンをタップして開始してください．</a:t>
+              <a:t>ボタンをクリックして開始してください．</a:t>
             </a:r>
             <a:endParaRPr lang="en-US" altLang="ja-JP" sz="2800" dirty="0">
               <a:solidFill>
@@ -5832,6 +5787,1177 @@
     <p:extLst>
       <p:ext uri="{BB962C8B-B14F-4D97-AF65-F5344CB8AC3E}">
         <p14:creationId xmlns:p14="http://schemas.microsoft.com/office/powerpoint/2010/main" val="3539291927"/>
+      </p:ext>
+    </p:extLst>
+  </p:cSld>
+  <p:clrMapOvr>
+    <a:masterClrMapping/>
+  </p:clrMapOvr>
+</p:sld>
+</file>
+
+<file path=ppt/slides/slide3.xml><?xml version="1.0" encoding="utf-8"?>
+<p:sld xmlns:a="http://schemas.openxmlformats.org/drawingml/2006/main" xmlns:r="http://schemas.openxmlformats.org/officeDocument/2006/relationships" xmlns:p="http://schemas.openxmlformats.org/presentationml/2006/main">
+  <p:cSld>
+    <p:spTree>
+      <p:nvGrpSpPr>
+        <p:cNvPr id="1" name=""/>
+        <p:cNvGrpSpPr/>
+        <p:nvPr/>
+      </p:nvGrpSpPr>
+      <p:grpSpPr>
+        <a:xfrm>
+          <a:off x="0" y="0"/>
+          <a:ext cx="0" cy="0"/>
+          <a:chOff x="0" y="0"/>
+          <a:chExt cx="0" cy="0"/>
+        </a:xfrm>
+      </p:grpSpPr>
+      <p:sp>
+        <p:nvSpPr>
+          <p:cNvPr id="29" name="正方形/長方形 28">
+            <a:extLst>
+              <a:ext uri="{FF2B5EF4-FFF2-40B4-BE49-F238E27FC236}">
+                <a16:creationId xmlns:a16="http://schemas.microsoft.com/office/drawing/2014/main" id="{16FBE669-21C3-405A-DB09-5BE1ECAA20E5}"/>
+              </a:ext>
+            </a:extLst>
+          </p:cNvPr>
+          <p:cNvSpPr/>
+          <p:nvPr/>
+        </p:nvSpPr>
+        <p:spPr>
+          <a:xfrm>
+            <a:off x="3772056" y="3492194"/>
+            <a:ext cx="4647888" cy="3186757"/>
+          </a:xfrm>
+          <a:prstGeom prst="rect">
+            <a:avLst/>
+          </a:prstGeom>
+          <a:solidFill>
+            <a:schemeClr val="tx1"/>
+          </a:solidFill>
+          <a:ln>
+            <a:solidFill>
+              <a:schemeClr val="tx1"/>
+            </a:solidFill>
+          </a:ln>
+        </p:spPr>
+        <p:style>
+          <a:lnRef idx="2">
+            <a:schemeClr val="accent1">
+              <a:shade val="15000"/>
+            </a:schemeClr>
+          </a:lnRef>
+          <a:fillRef idx="1">
+            <a:schemeClr val="accent1"/>
+          </a:fillRef>
+          <a:effectRef idx="0">
+            <a:schemeClr val="accent1"/>
+          </a:effectRef>
+          <a:fontRef idx="minor">
+            <a:schemeClr val="lt1"/>
+          </a:fontRef>
+        </p:style>
+        <p:txBody>
+          <a:bodyPr rtlCol="0" anchor="ctr"/>
+          <a:lstStyle/>
+          <a:p>
+            <a:pPr algn="ctr"/>
+            <a:endParaRPr kumimoji="1" lang="ja-JP" altLang="en-US"/>
+          </a:p>
+        </p:txBody>
+      </p:sp>
+      <p:cxnSp>
+        <p:nvCxnSpPr>
+          <p:cNvPr id="9" name="直線コネクタ 8">
+            <a:extLst>
+              <a:ext uri="{FF2B5EF4-FFF2-40B4-BE49-F238E27FC236}">
+                <a16:creationId xmlns:a16="http://schemas.microsoft.com/office/drawing/2014/main" id="{37454D10-16CF-F203-11DD-88CF99BF71DC}"/>
+              </a:ext>
+            </a:extLst>
+          </p:cNvPr>
+          <p:cNvCxnSpPr/>
+          <p:nvPr/>
+        </p:nvCxnSpPr>
+        <p:spPr>
+          <a:xfrm>
+            <a:off x="0" y="931985"/>
+            <a:ext cx="12192000" cy="0"/>
+          </a:xfrm>
+          <a:prstGeom prst="line">
+            <a:avLst/>
+          </a:prstGeom>
+          <a:ln w="57150">
+            <a:solidFill>
+              <a:srgbClr val="4472C4"/>
+            </a:solidFill>
+          </a:ln>
+        </p:spPr>
+        <p:style>
+          <a:lnRef idx="2">
+            <a:schemeClr val="accent1"/>
+          </a:lnRef>
+          <a:fillRef idx="0">
+            <a:schemeClr val="accent1"/>
+          </a:fillRef>
+          <a:effectRef idx="1">
+            <a:schemeClr val="accent1"/>
+          </a:effectRef>
+          <a:fontRef idx="minor">
+            <a:schemeClr val="tx1"/>
+          </a:fontRef>
+        </p:style>
+      </p:cxnSp>
+      <p:sp>
+        <p:nvSpPr>
+          <p:cNvPr id="10" name="テキスト ボックス 9">
+            <a:extLst>
+              <a:ext uri="{FF2B5EF4-FFF2-40B4-BE49-F238E27FC236}">
+                <a16:creationId xmlns:a16="http://schemas.microsoft.com/office/drawing/2014/main" id="{008AD286-8DD8-0AF2-820F-DAB9F7C461C5}"/>
+              </a:ext>
+            </a:extLst>
+          </p:cNvPr>
+          <p:cNvSpPr txBox="1"/>
+          <p:nvPr/>
+        </p:nvSpPr>
+        <p:spPr>
+          <a:xfrm>
+            <a:off x="0" y="123091"/>
+            <a:ext cx="12192000" cy="677108"/>
+          </a:xfrm>
+          <a:prstGeom prst="rect">
+            <a:avLst/>
+          </a:prstGeom>
+          <a:noFill/>
+        </p:spPr>
+        <p:txBody>
+          <a:bodyPr wrap="square" rtlCol="0">
+            <a:spAutoFit/>
+          </a:bodyPr>
+          <a:lstStyle/>
+          <a:p>
+            <a:pPr algn="ctr"/>
+            <a:r>
+              <a:rPr lang="ja-JP" altLang="en-US" sz="3800" b="1" dirty="0">
+                <a:solidFill>
+                  <a:srgbClr val="C00000"/>
+                </a:solidFill>
+                <a:latin typeface="メイリオ" panose="020B0604030504040204" pitchFamily="50" charset="-128"/>
+                <a:ea typeface="メイリオ" panose="020B0604030504040204" pitchFamily="50" charset="-128"/>
+                <a:cs typeface="Helvetica" panose="020B0604020202020204" pitchFamily="34" charset="0"/>
+              </a:rPr>
+              <a:t>質感判断課題</a:t>
+            </a:r>
+            <a:r>
+              <a:rPr lang="en-US" altLang="ja-JP" sz="3800" b="1" dirty="0">
+                <a:solidFill>
+                  <a:srgbClr val="4472C4"/>
+                </a:solidFill>
+                <a:latin typeface="メイリオ" panose="020B0604030504040204" pitchFamily="50" charset="-128"/>
+                <a:ea typeface="メイリオ" panose="020B0604030504040204" pitchFamily="50" charset="-128"/>
+                <a:cs typeface="Helvetica" panose="020B0604020202020204" pitchFamily="34" charset="0"/>
+              </a:rPr>
+              <a:t>:</a:t>
+            </a:r>
+            <a:r>
+              <a:rPr lang="ja-JP" altLang="en-US" sz="3800" b="1" dirty="0">
+                <a:solidFill>
+                  <a:srgbClr val="4472C4"/>
+                </a:solidFill>
+                <a:latin typeface="メイリオ" panose="020B0604030504040204" pitchFamily="50" charset="-128"/>
+                <a:ea typeface="メイリオ" panose="020B0604030504040204" pitchFamily="50" charset="-128"/>
+                <a:cs typeface="Helvetica" panose="020B0604020202020204" pitchFamily="34" charset="0"/>
+              </a:rPr>
+              <a:t> 教示</a:t>
+            </a:r>
+            <a:endParaRPr kumimoji="1" lang="ja-JP" altLang="en-US" sz="3800" dirty="0">
+              <a:solidFill>
+                <a:srgbClr val="4472C4"/>
+              </a:solidFill>
+              <a:latin typeface="メイリオ" panose="020B0604030504040204" pitchFamily="50" charset="-128"/>
+              <a:ea typeface="メイリオ" panose="020B0604030504040204" pitchFamily="50" charset="-128"/>
+              <a:cs typeface="Helvetica" panose="020B0604020202020204" pitchFamily="34" charset="0"/>
+            </a:endParaRPr>
+          </a:p>
+        </p:txBody>
+      </p:sp>
+      <p:sp>
+        <p:nvSpPr>
+          <p:cNvPr id="17" name="テキスト ボックス 16">
+            <a:extLst>
+              <a:ext uri="{FF2B5EF4-FFF2-40B4-BE49-F238E27FC236}">
+                <a16:creationId xmlns:a16="http://schemas.microsoft.com/office/drawing/2014/main" id="{F321C4BD-4BCE-A4C3-41C8-F9F1CB260381}"/>
+              </a:ext>
+            </a:extLst>
+          </p:cNvPr>
+          <p:cNvSpPr txBox="1"/>
+          <p:nvPr/>
+        </p:nvSpPr>
+        <p:spPr>
+          <a:xfrm>
+            <a:off x="143608" y="1247757"/>
+            <a:ext cx="11904784" cy="2246769"/>
+          </a:xfrm>
+          <a:prstGeom prst="rect">
+            <a:avLst/>
+          </a:prstGeom>
+          <a:noFill/>
+        </p:spPr>
+        <p:txBody>
+          <a:bodyPr wrap="square" rtlCol="0">
+            <a:spAutoFit/>
+          </a:bodyPr>
+          <a:lstStyle/>
+          <a:p>
+            <a:pPr marL="457200" indent="-457200">
+              <a:buFont typeface="Arial" panose="020B0604020202020204" pitchFamily="34" charset="0"/>
+              <a:buChar char="•"/>
+            </a:pPr>
+            <a:r>
+              <a:rPr kumimoji="1" lang="ja-JP" altLang="en-US" sz="2800" dirty="0">
+                <a:solidFill>
+                  <a:srgbClr val="1F3764"/>
+                </a:solidFill>
+                <a:latin typeface="メイリオ" panose="020B0604030504040204" pitchFamily="50" charset="-128"/>
+                <a:ea typeface="メイリオ" panose="020B0604030504040204" pitchFamily="50" charset="-128"/>
+                <a:cs typeface="Helvetica" panose="020B0604020202020204" pitchFamily="34" charset="0"/>
+              </a:rPr>
+              <a:t>この実験では，画面に</a:t>
+            </a:r>
+            <a:r>
+              <a:rPr kumimoji="1" lang="en-US" altLang="ja-JP" sz="2800" dirty="0">
+                <a:solidFill>
+                  <a:srgbClr val="1F3764"/>
+                </a:solidFill>
+                <a:latin typeface="メイリオ" panose="020B0604030504040204" pitchFamily="50" charset="-128"/>
+                <a:ea typeface="メイリオ" panose="020B0604030504040204" pitchFamily="50" charset="-128"/>
+                <a:cs typeface="Helvetica" panose="020B0604020202020204" pitchFamily="34" charset="0"/>
+              </a:rPr>
+              <a:t>4</a:t>
+            </a:r>
+            <a:r>
+              <a:rPr lang="ja-JP" altLang="en-US" sz="2800" dirty="0">
+                <a:solidFill>
+                  <a:srgbClr val="1F3764"/>
+                </a:solidFill>
+                <a:latin typeface="メイリオ" panose="020B0604030504040204" pitchFamily="50" charset="-128"/>
+                <a:ea typeface="メイリオ" panose="020B0604030504040204" pitchFamily="50" charset="-128"/>
+                <a:cs typeface="Helvetica" panose="020B0604020202020204" pitchFamily="34" charset="0"/>
+              </a:rPr>
+              <a:t>つ</a:t>
+            </a:r>
+            <a:r>
+              <a:rPr kumimoji="1" lang="ja-JP" altLang="en-US" sz="2800" dirty="0">
+                <a:solidFill>
+                  <a:srgbClr val="1F3764"/>
+                </a:solidFill>
+                <a:latin typeface="メイリオ" panose="020B0604030504040204" pitchFamily="50" charset="-128"/>
+                <a:ea typeface="メイリオ" panose="020B0604030504040204" pitchFamily="50" charset="-128"/>
+                <a:cs typeface="Helvetica" panose="020B0604020202020204" pitchFamily="34" charset="0"/>
+              </a:rPr>
+              <a:t>の物体画像が提示されます．</a:t>
+            </a:r>
+            <a:endParaRPr kumimoji="1" lang="en-US" altLang="ja-JP" sz="2800" dirty="0">
+              <a:solidFill>
+                <a:srgbClr val="1F3764"/>
+              </a:solidFill>
+              <a:latin typeface="メイリオ" panose="020B0604030504040204" pitchFamily="50" charset="-128"/>
+              <a:ea typeface="メイリオ" panose="020B0604030504040204" pitchFamily="50" charset="-128"/>
+              <a:cs typeface="Helvetica" panose="020B0604020202020204" pitchFamily="34" charset="0"/>
+            </a:endParaRPr>
+          </a:p>
+          <a:p>
+            <a:pPr marL="457200" indent="-457200">
+              <a:buFont typeface="Arial" panose="020B0604020202020204" pitchFamily="34" charset="0"/>
+              <a:buChar char="•"/>
+            </a:pPr>
+            <a:r>
+              <a:rPr lang="en-US" altLang="ja-JP" sz="2800" dirty="0">
+                <a:solidFill>
+                  <a:srgbClr val="1F3764"/>
+                </a:solidFill>
+                <a:latin typeface="メイリオ" panose="020B0604030504040204" pitchFamily="50" charset="-128"/>
+                <a:ea typeface="メイリオ" panose="020B0604030504040204" pitchFamily="50" charset="-128"/>
+                <a:cs typeface="Helvetica" panose="020B0604020202020204" pitchFamily="34" charset="0"/>
+              </a:rPr>
+              <a:t>4</a:t>
+            </a:r>
+            <a:r>
+              <a:rPr lang="ja-JP" altLang="en-US" sz="2800" dirty="0">
+                <a:solidFill>
+                  <a:srgbClr val="1F3764"/>
+                </a:solidFill>
+                <a:latin typeface="メイリオ" panose="020B0604030504040204" pitchFamily="50" charset="-128"/>
+                <a:ea typeface="メイリオ" panose="020B0604030504040204" pitchFamily="50" charset="-128"/>
+                <a:cs typeface="Helvetica" panose="020B0604020202020204" pitchFamily="34" charset="0"/>
+              </a:rPr>
+              <a:t>つの物体画像のうち，ひとつだけ異なる材質の物体があります．その物体画像を画面タップで選択してください．</a:t>
+            </a:r>
+            <a:endParaRPr lang="en-US" altLang="ja-JP" sz="2800" dirty="0">
+              <a:solidFill>
+                <a:srgbClr val="1F3764"/>
+              </a:solidFill>
+              <a:latin typeface="メイリオ" panose="020B0604030504040204" pitchFamily="50" charset="-128"/>
+              <a:ea typeface="メイリオ" panose="020B0604030504040204" pitchFamily="50" charset="-128"/>
+              <a:cs typeface="Helvetica" panose="020B0604020202020204" pitchFamily="34" charset="0"/>
+            </a:endParaRPr>
+          </a:p>
+          <a:p>
+            <a:pPr marL="457200" indent="-457200">
+              <a:buFont typeface="Arial" panose="020B0604020202020204" pitchFamily="34" charset="0"/>
+              <a:buChar char="•"/>
+            </a:pPr>
+            <a:r>
+              <a:rPr lang="en-US" altLang="ja-JP" sz="2800" dirty="0">
+                <a:solidFill>
+                  <a:srgbClr val="1F3764"/>
+                </a:solidFill>
+                <a:latin typeface="メイリオ" panose="020B0604030504040204" pitchFamily="50" charset="-128"/>
+                <a:ea typeface="メイリオ" panose="020B0604030504040204" pitchFamily="50" charset="-128"/>
+                <a:cs typeface="Helvetica" panose="020B0604020202020204" pitchFamily="34" charset="0"/>
+              </a:rPr>
+              <a:t>4</a:t>
+            </a:r>
+            <a:r>
+              <a:rPr lang="ja-JP" altLang="en-US" sz="2800" dirty="0">
+                <a:solidFill>
+                  <a:srgbClr val="1F3764"/>
+                </a:solidFill>
+                <a:latin typeface="メイリオ" panose="020B0604030504040204" pitchFamily="50" charset="-128"/>
+                <a:ea typeface="メイリオ" panose="020B0604030504040204" pitchFamily="50" charset="-128"/>
+                <a:cs typeface="Helvetica" panose="020B0604020202020204" pitchFamily="34" charset="0"/>
+              </a:rPr>
+              <a:t>つの物体画像はそれぞれ異なる向きで提示されますが，向きの違いは無視して材質の違いに注目して選択してください．</a:t>
+            </a:r>
+            <a:endParaRPr lang="en-US" altLang="ja-JP" sz="2800" dirty="0">
+              <a:solidFill>
+                <a:srgbClr val="1F3764"/>
+              </a:solidFill>
+              <a:latin typeface="メイリオ" panose="020B0604030504040204" pitchFamily="50" charset="-128"/>
+              <a:ea typeface="メイリオ" panose="020B0604030504040204" pitchFamily="50" charset="-128"/>
+              <a:cs typeface="Helvetica" panose="020B0604020202020204" pitchFamily="34" charset="0"/>
+            </a:endParaRPr>
+          </a:p>
+        </p:txBody>
+      </p:sp>
+      <p:grpSp>
+        <p:nvGrpSpPr>
+          <p:cNvPr id="28" name="グループ化 27">
+            <a:extLst>
+              <a:ext uri="{FF2B5EF4-FFF2-40B4-BE49-F238E27FC236}">
+                <a16:creationId xmlns:a16="http://schemas.microsoft.com/office/drawing/2014/main" id="{9E52350D-0ED5-3A8B-9275-5563A879DBAF}"/>
+              </a:ext>
+            </a:extLst>
+          </p:cNvPr>
+          <p:cNvGrpSpPr/>
+          <p:nvPr/>
+        </p:nvGrpSpPr>
+        <p:grpSpPr>
+          <a:xfrm>
+            <a:off x="4612870" y="3489553"/>
+            <a:ext cx="2966259" cy="2968028"/>
+            <a:chOff x="4207380" y="3695876"/>
+            <a:chExt cx="2966259" cy="2968028"/>
+          </a:xfrm>
+        </p:grpSpPr>
+        <p:pic>
+          <p:nvPicPr>
+            <p:cNvPr id="7" name="図 6" descr="屋内, 座る, テーブル, 暗い が含まれている画像&#10;&#10;自動的に生成された説明">
+              <a:extLst>
+                <a:ext uri="{FF2B5EF4-FFF2-40B4-BE49-F238E27FC236}">
+                  <a16:creationId xmlns:a16="http://schemas.microsoft.com/office/drawing/2014/main" id="{EF4FD4B3-6247-7C6E-B492-19B934C454AB}"/>
+                </a:ext>
+              </a:extLst>
+            </p:cNvPr>
+            <p:cNvPicPr>
+              <a:picLocks noChangeAspect="1"/>
+            </p:cNvPicPr>
+            <p:nvPr/>
+          </p:nvPicPr>
+          <p:blipFill>
+            <a:blip r:embed="rId2">
+              <a:extLst>
+                <a:ext uri="{28A0092B-C50C-407E-A947-70E740481C1C}">
+                  <a14:useLocalDpi xmlns:a14="http://schemas.microsoft.com/office/drawing/2010/main" val="0"/>
+                </a:ext>
+              </a:extLst>
+            </a:blip>
+            <a:stretch>
+              <a:fillRect/>
+            </a:stretch>
+          </p:blipFill>
+          <p:spPr>
+            <a:xfrm>
+              <a:off x="5733639" y="5223904"/>
+              <a:ext cx="1440000" cy="1440000"/>
+            </a:xfrm>
+            <a:prstGeom prst="rect">
+              <a:avLst/>
+            </a:prstGeom>
+          </p:spPr>
+        </p:pic>
+        <p:pic>
+          <p:nvPicPr>
+            <p:cNvPr id="13" name="図 12" descr="屋内, テーブル, 座る, 皿 が含まれている画像&#10;&#10;自動的に生成された説明">
+              <a:extLst>
+                <a:ext uri="{FF2B5EF4-FFF2-40B4-BE49-F238E27FC236}">
+                  <a16:creationId xmlns:a16="http://schemas.microsoft.com/office/drawing/2014/main" id="{4F05179B-8B64-CA9A-FCDE-28057FBFCB68}"/>
+                </a:ext>
+              </a:extLst>
+            </p:cNvPr>
+            <p:cNvPicPr>
+              <a:picLocks noChangeAspect="1"/>
+            </p:cNvPicPr>
+            <p:nvPr/>
+          </p:nvPicPr>
+          <p:blipFill>
+            <a:blip r:embed="rId3">
+              <a:extLst>
+                <a:ext uri="{28A0092B-C50C-407E-A947-70E740481C1C}">
+                  <a14:useLocalDpi xmlns:a14="http://schemas.microsoft.com/office/drawing/2010/main" val="0"/>
+                </a:ext>
+              </a:extLst>
+            </a:blip>
+            <a:stretch>
+              <a:fillRect/>
+            </a:stretch>
+          </p:blipFill>
+          <p:spPr>
+            <a:xfrm>
+              <a:off x="4207380" y="5223904"/>
+              <a:ext cx="1440000" cy="1440000"/>
+            </a:xfrm>
+            <a:prstGeom prst="rect">
+              <a:avLst/>
+            </a:prstGeom>
+          </p:spPr>
+        </p:pic>
+        <p:pic>
+          <p:nvPicPr>
+            <p:cNvPr id="18" name="図 17" descr="屋内, テーブル, 座る, 暗い が含まれている画像&#10;&#10;自動的に生成された説明">
+              <a:extLst>
+                <a:ext uri="{FF2B5EF4-FFF2-40B4-BE49-F238E27FC236}">
+                  <a16:creationId xmlns:a16="http://schemas.microsoft.com/office/drawing/2014/main" id="{AA3CFC26-64D4-4BFF-EBB6-20A9CC326829}"/>
+                </a:ext>
+              </a:extLst>
+            </p:cNvPr>
+            <p:cNvPicPr>
+              <a:picLocks noChangeAspect="1"/>
+            </p:cNvPicPr>
+            <p:nvPr/>
+          </p:nvPicPr>
+          <p:blipFill>
+            <a:blip r:embed="rId4">
+              <a:extLst>
+                <a:ext uri="{28A0092B-C50C-407E-A947-70E740481C1C}">
+                  <a14:useLocalDpi xmlns:a14="http://schemas.microsoft.com/office/drawing/2010/main" val="0"/>
+                </a:ext>
+              </a:extLst>
+            </a:blip>
+            <a:stretch>
+              <a:fillRect/>
+            </a:stretch>
+          </p:blipFill>
+          <p:spPr>
+            <a:xfrm>
+              <a:off x="4207380" y="3695876"/>
+              <a:ext cx="1440000" cy="1440000"/>
+            </a:xfrm>
+            <a:prstGeom prst="rect">
+              <a:avLst/>
+            </a:prstGeom>
+          </p:spPr>
+        </p:pic>
+        <p:pic>
+          <p:nvPicPr>
+            <p:cNvPr id="26" name="図 25" descr="屋内, 座る, テーブル, 暗い が含まれている画像&#10;&#10;自動的に生成された説明">
+              <a:extLst>
+                <a:ext uri="{FF2B5EF4-FFF2-40B4-BE49-F238E27FC236}">
+                  <a16:creationId xmlns:a16="http://schemas.microsoft.com/office/drawing/2014/main" id="{2F08C7D5-AAE1-79B4-4023-C2503DBBC55E}"/>
+                </a:ext>
+              </a:extLst>
+            </p:cNvPr>
+            <p:cNvPicPr>
+              <a:picLocks noChangeAspect="1"/>
+            </p:cNvPicPr>
+            <p:nvPr/>
+          </p:nvPicPr>
+          <p:blipFill>
+            <a:blip r:embed="rId5">
+              <a:extLst>
+                <a:ext uri="{28A0092B-C50C-407E-A947-70E740481C1C}">
+                  <a14:useLocalDpi xmlns:a14="http://schemas.microsoft.com/office/drawing/2010/main" val="0"/>
+                </a:ext>
+              </a:extLst>
+            </a:blip>
+            <a:stretch>
+              <a:fillRect/>
+            </a:stretch>
+          </p:blipFill>
+          <p:spPr>
+            <a:xfrm>
+              <a:off x="5733639" y="3695876"/>
+              <a:ext cx="1440000" cy="1440000"/>
+            </a:xfrm>
+            <a:prstGeom prst="rect">
+              <a:avLst/>
+            </a:prstGeom>
+          </p:spPr>
+        </p:pic>
+      </p:grpSp>
+    </p:spTree>
+    <p:extLst>
+      <p:ext uri="{BB962C8B-B14F-4D97-AF65-F5344CB8AC3E}">
+        <p14:creationId xmlns:p14="http://schemas.microsoft.com/office/powerpoint/2010/main" val="2082306417"/>
+      </p:ext>
+    </p:extLst>
+  </p:cSld>
+  <p:clrMapOvr>
+    <a:masterClrMapping/>
+  </p:clrMapOvr>
+</p:sld>
+</file>
+
+<file path=ppt/slides/slide4.xml><?xml version="1.0" encoding="utf-8"?>
+<p:sld xmlns:a="http://schemas.openxmlformats.org/drawingml/2006/main" xmlns:r="http://schemas.openxmlformats.org/officeDocument/2006/relationships" xmlns:p="http://schemas.openxmlformats.org/presentationml/2006/main">
+  <p:cSld>
+    <p:spTree>
+      <p:nvGrpSpPr>
+        <p:cNvPr id="1" name=""/>
+        <p:cNvGrpSpPr/>
+        <p:nvPr/>
+      </p:nvGrpSpPr>
+      <p:grpSpPr>
+        <a:xfrm>
+          <a:off x="0" y="0"/>
+          <a:ext cx="0" cy="0"/>
+          <a:chOff x="0" y="0"/>
+          <a:chExt cx="0" cy="0"/>
+        </a:xfrm>
+      </p:grpSpPr>
+      <p:cxnSp>
+        <p:nvCxnSpPr>
+          <p:cNvPr id="9" name="直線コネクタ 8">
+            <a:extLst>
+              <a:ext uri="{FF2B5EF4-FFF2-40B4-BE49-F238E27FC236}">
+                <a16:creationId xmlns:a16="http://schemas.microsoft.com/office/drawing/2014/main" id="{37454D10-16CF-F203-11DD-88CF99BF71DC}"/>
+              </a:ext>
+            </a:extLst>
+          </p:cNvPr>
+          <p:cNvCxnSpPr/>
+          <p:nvPr/>
+        </p:nvCxnSpPr>
+        <p:spPr>
+          <a:xfrm>
+            <a:off x="0" y="931985"/>
+            <a:ext cx="12192000" cy="0"/>
+          </a:xfrm>
+          <a:prstGeom prst="line">
+            <a:avLst/>
+          </a:prstGeom>
+          <a:ln w="57150">
+            <a:solidFill>
+              <a:srgbClr val="4472C4"/>
+            </a:solidFill>
+          </a:ln>
+        </p:spPr>
+        <p:style>
+          <a:lnRef idx="2">
+            <a:schemeClr val="accent1"/>
+          </a:lnRef>
+          <a:fillRef idx="0">
+            <a:schemeClr val="accent1"/>
+          </a:fillRef>
+          <a:effectRef idx="1">
+            <a:schemeClr val="accent1"/>
+          </a:effectRef>
+          <a:fontRef idx="minor">
+            <a:schemeClr val="tx1"/>
+          </a:fontRef>
+        </p:style>
+      </p:cxnSp>
+      <p:sp>
+        <p:nvSpPr>
+          <p:cNvPr id="10" name="テキスト ボックス 9">
+            <a:extLst>
+              <a:ext uri="{FF2B5EF4-FFF2-40B4-BE49-F238E27FC236}">
+                <a16:creationId xmlns:a16="http://schemas.microsoft.com/office/drawing/2014/main" id="{008AD286-8DD8-0AF2-820F-DAB9F7C461C5}"/>
+              </a:ext>
+            </a:extLst>
+          </p:cNvPr>
+          <p:cNvSpPr txBox="1"/>
+          <p:nvPr/>
+        </p:nvSpPr>
+        <p:spPr>
+          <a:xfrm>
+            <a:off x="0" y="123091"/>
+            <a:ext cx="12192000" cy="677108"/>
+          </a:xfrm>
+          <a:prstGeom prst="rect">
+            <a:avLst/>
+          </a:prstGeom>
+          <a:noFill/>
+        </p:spPr>
+        <p:txBody>
+          <a:bodyPr wrap="square" rtlCol="0">
+            <a:spAutoFit/>
+          </a:bodyPr>
+          <a:lstStyle/>
+          <a:p>
+            <a:pPr algn="ctr"/>
+            <a:r>
+              <a:rPr lang="ja-JP" altLang="en-US" sz="3800" b="1" dirty="0">
+                <a:solidFill>
+                  <a:srgbClr val="C00000"/>
+                </a:solidFill>
+                <a:latin typeface="メイリオ" panose="020B0604030504040204" pitchFamily="50" charset="-128"/>
+                <a:ea typeface="メイリオ" panose="020B0604030504040204" pitchFamily="50" charset="-128"/>
+                <a:cs typeface="Helvetica" panose="020B0604020202020204" pitchFamily="34" charset="0"/>
+              </a:rPr>
+              <a:t>質感判断課題</a:t>
+            </a:r>
+            <a:r>
+              <a:rPr lang="en-US" altLang="ja-JP" sz="3800" b="1" dirty="0">
+                <a:solidFill>
+                  <a:srgbClr val="4472C4"/>
+                </a:solidFill>
+                <a:latin typeface="メイリオ" panose="020B0604030504040204" pitchFamily="50" charset="-128"/>
+                <a:ea typeface="メイリオ" panose="020B0604030504040204" pitchFamily="50" charset="-128"/>
+                <a:cs typeface="Helvetica" panose="020B0604020202020204" pitchFamily="34" charset="0"/>
+              </a:rPr>
+              <a:t>:</a:t>
+            </a:r>
+            <a:r>
+              <a:rPr lang="ja-JP" altLang="en-US" sz="3800" b="1" dirty="0">
+                <a:solidFill>
+                  <a:srgbClr val="4472C4"/>
+                </a:solidFill>
+                <a:latin typeface="メイリオ" panose="020B0604030504040204" pitchFamily="50" charset="-128"/>
+                <a:ea typeface="メイリオ" panose="020B0604030504040204" pitchFamily="50" charset="-128"/>
+                <a:cs typeface="Helvetica" panose="020B0604020202020204" pitchFamily="34" charset="0"/>
+              </a:rPr>
+              <a:t> 教示</a:t>
+            </a:r>
+            <a:endParaRPr kumimoji="1" lang="ja-JP" altLang="en-US" sz="3800" dirty="0">
+              <a:solidFill>
+                <a:srgbClr val="4472C4"/>
+              </a:solidFill>
+              <a:latin typeface="メイリオ" panose="020B0604030504040204" pitchFamily="50" charset="-128"/>
+              <a:ea typeface="メイリオ" panose="020B0604030504040204" pitchFamily="50" charset="-128"/>
+              <a:cs typeface="Helvetica" panose="020B0604020202020204" pitchFamily="34" charset="0"/>
+            </a:endParaRPr>
+          </a:p>
+        </p:txBody>
+      </p:sp>
+      <p:sp>
+        <p:nvSpPr>
+          <p:cNvPr id="17" name="テキスト ボックス 16">
+            <a:extLst>
+              <a:ext uri="{FF2B5EF4-FFF2-40B4-BE49-F238E27FC236}">
+                <a16:creationId xmlns:a16="http://schemas.microsoft.com/office/drawing/2014/main" id="{F321C4BD-4BCE-A4C3-41C8-F9F1CB260381}"/>
+              </a:ext>
+            </a:extLst>
+          </p:cNvPr>
+          <p:cNvSpPr txBox="1"/>
+          <p:nvPr/>
+        </p:nvSpPr>
+        <p:spPr>
+          <a:xfrm>
+            <a:off x="143608" y="1247757"/>
+            <a:ext cx="11904784" cy="2246769"/>
+          </a:xfrm>
+          <a:prstGeom prst="rect">
+            <a:avLst/>
+          </a:prstGeom>
+          <a:noFill/>
+        </p:spPr>
+        <p:txBody>
+          <a:bodyPr wrap="square" rtlCol="0">
+            <a:spAutoFit/>
+          </a:bodyPr>
+          <a:lstStyle/>
+          <a:p>
+            <a:pPr marL="457200" indent="-457200">
+              <a:buFont typeface="Arial" panose="020B0604020202020204" pitchFamily="34" charset="0"/>
+              <a:buChar char="•"/>
+            </a:pPr>
+            <a:r>
+              <a:rPr lang="ja-JP" altLang="en-US" sz="2800" dirty="0">
+                <a:solidFill>
+                  <a:srgbClr val="1F3764"/>
+                </a:solidFill>
+                <a:latin typeface="メイリオ" panose="020B0604030504040204" pitchFamily="50" charset="-128"/>
+                <a:ea typeface="メイリオ" panose="020B0604030504040204" pitchFamily="50" charset="-128"/>
+                <a:cs typeface="Helvetica" panose="020B0604020202020204" pitchFamily="34" charset="0"/>
+              </a:rPr>
+              <a:t>画面を約</a:t>
+            </a:r>
+            <a:r>
+              <a:rPr lang="en-US" altLang="ja-JP" sz="2800" dirty="0">
+                <a:solidFill>
+                  <a:srgbClr val="1F3764"/>
+                </a:solidFill>
+                <a:latin typeface="メイリオ" panose="020B0604030504040204" pitchFamily="50" charset="-128"/>
+                <a:ea typeface="メイリオ" panose="020B0604030504040204" pitchFamily="50" charset="-128"/>
+                <a:cs typeface="Helvetica" panose="020B0604020202020204" pitchFamily="34" charset="0"/>
+              </a:rPr>
+              <a:t>30cm</a:t>
+            </a:r>
+            <a:r>
+              <a:rPr lang="ja-JP" altLang="en-US" sz="2800" dirty="0">
+                <a:solidFill>
+                  <a:srgbClr val="1F3764"/>
+                </a:solidFill>
+                <a:latin typeface="メイリオ" panose="020B0604030504040204" pitchFamily="50" charset="-128"/>
+                <a:ea typeface="メイリオ" panose="020B0604030504040204" pitchFamily="50" charset="-128"/>
+                <a:cs typeface="Helvetica" panose="020B0604020202020204" pitchFamily="34" charset="0"/>
+              </a:rPr>
+              <a:t>離れた距離から観察して実験を行ってください．</a:t>
+            </a:r>
+            <a:endParaRPr lang="en-US" altLang="ja-JP" sz="2800" dirty="0">
+              <a:solidFill>
+                <a:srgbClr val="1F3764"/>
+              </a:solidFill>
+              <a:latin typeface="メイリオ" panose="020B0604030504040204" pitchFamily="50" charset="-128"/>
+              <a:ea typeface="メイリオ" panose="020B0604030504040204" pitchFamily="50" charset="-128"/>
+              <a:cs typeface="Helvetica" panose="020B0604020202020204" pitchFamily="34" charset="0"/>
+            </a:endParaRPr>
+          </a:p>
+          <a:p>
+            <a:pPr marL="457200" indent="-457200">
+              <a:buFont typeface="Arial" panose="020B0604020202020204" pitchFamily="34" charset="0"/>
+              <a:buChar char="•"/>
+            </a:pPr>
+            <a:endParaRPr lang="en-US" altLang="ja-JP" sz="2800" dirty="0">
+              <a:solidFill>
+                <a:srgbClr val="1F3764"/>
+              </a:solidFill>
+              <a:latin typeface="メイリオ" panose="020B0604030504040204" pitchFamily="50" charset="-128"/>
+              <a:ea typeface="メイリオ" panose="020B0604030504040204" pitchFamily="50" charset="-128"/>
+              <a:cs typeface="Helvetica" panose="020B0604020202020204" pitchFamily="34" charset="0"/>
+            </a:endParaRPr>
+          </a:p>
+          <a:p>
+            <a:pPr marL="457200" indent="-457200">
+              <a:buFont typeface="Arial" panose="020B0604020202020204" pitchFamily="34" charset="0"/>
+              <a:buChar char="•"/>
+            </a:pPr>
+            <a:r>
+              <a:rPr lang="ja-JP" altLang="en-US" sz="2800" dirty="0">
+                <a:solidFill>
+                  <a:srgbClr val="1F3764"/>
+                </a:solidFill>
+                <a:latin typeface="メイリオ" panose="020B0604030504040204" pitchFamily="50" charset="-128"/>
+                <a:ea typeface="メイリオ" panose="020B0604030504040204" pitchFamily="50" charset="-128"/>
+                <a:cs typeface="Helvetica" panose="020B0604020202020204" pitchFamily="34" charset="0"/>
+              </a:rPr>
+              <a:t>実験全体は</a:t>
+            </a:r>
+            <a:r>
+              <a:rPr lang="en-US" altLang="ja-JP" sz="2800" dirty="0">
+                <a:solidFill>
+                  <a:srgbClr val="1F3764"/>
+                </a:solidFill>
+                <a:latin typeface="メイリオ" panose="020B0604030504040204" pitchFamily="50" charset="-128"/>
+                <a:ea typeface="メイリオ" panose="020B0604030504040204" pitchFamily="50" charset="-128"/>
+                <a:cs typeface="Helvetica" panose="020B0604020202020204" pitchFamily="34" charset="0"/>
+              </a:rPr>
+              <a:t>80</a:t>
+            </a:r>
+            <a:r>
+              <a:rPr lang="ja-JP" altLang="en-US" sz="2800" dirty="0">
+                <a:solidFill>
+                  <a:srgbClr val="1F3764"/>
+                </a:solidFill>
+                <a:latin typeface="メイリオ" panose="020B0604030504040204" pitchFamily="50" charset="-128"/>
+                <a:ea typeface="メイリオ" panose="020B0604030504040204" pitchFamily="50" charset="-128"/>
+                <a:cs typeface="Helvetica" panose="020B0604020202020204" pitchFamily="34" charset="0"/>
+              </a:rPr>
+              <a:t>試行の課題が</a:t>
+            </a:r>
+            <a:r>
+              <a:rPr lang="en-US" altLang="ja-JP" sz="2800" dirty="0">
+                <a:solidFill>
+                  <a:srgbClr val="1F3764"/>
+                </a:solidFill>
+                <a:latin typeface="メイリオ" panose="020B0604030504040204" pitchFamily="50" charset="-128"/>
+                <a:ea typeface="メイリオ" panose="020B0604030504040204" pitchFamily="50" charset="-128"/>
+                <a:cs typeface="Helvetica" panose="020B0604020202020204" pitchFamily="34" charset="0"/>
+              </a:rPr>
+              <a:t>5</a:t>
+            </a:r>
+            <a:r>
+              <a:rPr lang="ja-JP" altLang="en-US" sz="2800" dirty="0">
+                <a:solidFill>
+                  <a:srgbClr val="1F3764"/>
+                </a:solidFill>
+                <a:latin typeface="メイリオ" panose="020B0604030504040204" pitchFamily="50" charset="-128"/>
+                <a:ea typeface="メイリオ" panose="020B0604030504040204" pitchFamily="50" charset="-128"/>
+                <a:cs typeface="Helvetica" panose="020B0604020202020204" pitchFamily="34" charset="0"/>
+              </a:rPr>
+              <a:t>ブロックあります</a:t>
+            </a:r>
+            <a:r>
+              <a:rPr lang="en-US" altLang="ja-JP" sz="2800" dirty="0">
+                <a:solidFill>
+                  <a:srgbClr val="1F3764"/>
+                </a:solidFill>
+                <a:latin typeface="メイリオ" panose="020B0604030504040204" pitchFamily="50" charset="-128"/>
+                <a:ea typeface="メイリオ" panose="020B0604030504040204" pitchFamily="50" charset="-128"/>
+                <a:cs typeface="Helvetica" panose="020B0604020202020204" pitchFamily="34" charset="0"/>
+              </a:rPr>
+              <a:t>(</a:t>
+            </a:r>
+            <a:r>
+              <a:rPr lang="ja-JP" altLang="en-US" sz="2800" dirty="0">
+                <a:solidFill>
+                  <a:srgbClr val="1F3764"/>
+                </a:solidFill>
+                <a:latin typeface="メイリオ" panose="020B0604030504040204" pitchFamily="50" charset="-128"/>
+                <a:ea typeface="メイリオ" panose="020B0604030504040204" pitchFamily="50" charset="-128"/>
+                <a:cs typeface="Helvetica" panose="020B0604020202020204" pitchFamily="34" charset="0"/>
+              </a:rPr>
+              <a:t>合計</a:t>
+            </a:r>
+            <a:r>
+              <a:rPr lang="en-US" altLang="ja-JP" sz="2800" dirty="0">
+                <a:solidFill>
+                  <a:srgbClr val="1F3764"/>
+                </a:solidFill>
+                <a:latin typeface="メイリオ" panose="020B0604030504040204" pitchFamily="50" charset="-128"/>
+                <a:ea typeface="メイリオ" panose="020B0604030504040204" pitchFamily="50" charset="-128"/>
+                <a:cs typeface="Helvetica" panose="020B0604020202020204" pitchFamily="34" charset="0"/>
+              </a:rPr>
+              <a:t>400</a:t>
+            </a:r>
+            <a:r>
+              <a:rPr lang="ja-JP" altLang="en-US" sz="2800" dirty="0">
+                <a:solidFill>
+                  <a:srgbClr val="1F3764"/>
+                </a:solidFill>
+                <a:latin typeface="メイリオ" panose="020B0604030504040204" pitchFamily="50" charset="-128"/>
+                <a:ea typeface="メイリオ" panose="020B0604030504040204" pitchFamily="50" charset="-128"/>
+                <a:cs typeface="Helvetica" panose="020B0604020202020204" pitchFamily="34" charset="0"/>
+              </a:rPr>
+              <a:t>試行</a:t>
+            </a:r>
+            <a:r>
+              <a:rPr lang="en-US" altLang="ja-JP" sz="2800" dirty="0">
+                <a:solidFill>
+                  <a:srgbClr val="1F3764"/>
+                </a:solidFill>
+                <a:latin typeface="メイリオ" panose="020B0604030504040204" pitchFamily="50" charset="-128"/>
+                <a:ea typeface="メイリオ" panose="020B0604030504040204" pitchFamily="50" charset="-128"/>
+                <a:cs typeface="Helvetica" panose="020B0604020202020204" pitchFamily="34" charset="0"/>
+              </a:rPr>
+              <a:t>)</a:t>
+            </a:r>
+            <a:r>
+              <a:rPr lang="ja-JP" altLang="en-US" sz="2800" dirty="0">
+                <a:solidFill>
+                  <a:srgbClr val="1F3764"/>
+                </a:solidFill>
+                <a:latin typeface="メイリオ" panose="020B0604030504040204" pitchFamily="50" charset="-128"/>
+                <a:ea typeface="メイリオ" panose="020B0604030504040204" pitchFamily="50" charset="-128"/>
+                <a:cs typeface="Helvetica" panose="020B0604020202020204" pitchFamily="34" charset="0"/>
+              </a:rPr>
+              <a:t>．</a:t>
+            </a:r>
+            <a:endParaRPr lang="en-US" altLang="ja-JP" sz="2800" dirty="0">
+              <a:solidFill>
+                <a:srgbClr val="1F3764"/>
+              </a:solidFill>
+              <a:latin typeface="メイリオ" panose="020B0604030504040204" pitchFamily="50" charset="-128"/>
+              <a:ea typeface="メイリオ" panose="020B0604030504040204" pitchFamily="50" charset="-128"/>
+              <a:cs typeface="Helvetica" panose="020B0604020202020204" pitchFamily="34" charset="0"/>
+            </a:endParaRPr>
+          </a:p>
+          <a:p>
+            <a:pPr marL="457200" indent="-457200">
+              <a:buFont typeface="Arial" panose="020B0604020202020204" pitchFamily="34" charset="0"/>
+              <a:buChar char="•"/>
+            </a:pPr>
+            <a:endParaRPr lang="en-US" altLang="ja-JP" sz="2800" dirty="0">
+              <a:solidFill>
+                <a:srgbClr val="1F3764"/>
+              </a:solidFill>
+              <a:latin typeface="メイリオ" panose="020B0604030504040204" pitchFamily="50" charset="-128"/>
+              <a:ea typeface="メイリオ" panose="020B0604030504040204" pitchFamily="50" charset="-128"/>
+              <a:cs typeface="Helvetica" panose="020B0604020202020204" pitchFamily="34" charset="0"/>
+            </a:endParaRPr>
+          </a:p>
+          <a:p>
+            <a:pPr marL="457200" indent="-457200">
+              <a:buFont typeface="Arial" panose="020B0604020202020204" pitchFamily="34" charset="0"/>
+              <a:buChar char="•"/>
+            </a:pPr>
+            <a:r>
+              <a:rPr lang="ja-JP" altLang="en-US" sz="2800" dirty="0">
+                <a:solidFill>
+                  <a:srgbClr val="1F3764"/>
+                </a:solidFill>
+                <a:latin typeface="メイリオ" panose="020B0604030504040204" pitchFamily="50" charset="-128"/>
+                <a:ea typeface="メイリオ" panose="020B0604030504040204" pitchFamily="50" charset="-128"/>
+                <a:cs typeface="Helvetica" panose="020B0604020202020204" pitchFamily="34" charset="0"/>
+              </a:rPr>
+              <a:t>準備ができたら画面下の</a:t>
+            </a:r>
+            <a:r>
+              <a:rPr lang="en-US" altLang="ja-JP" sz="2800" dirty="0">
+                <a:solidFill>
+                  <a:srgbClr val="1F3764"/>
+                </a:solidFill>
+                <a:latin typeface="メイリオ" panose="020B0604030504040204" pitchFamily="50" charset="-128"/>
+                <a:ea typeface="メイリオ" panose="020B0604030504040204" pitchFamily="50" charset="-128"/>
+                <a:cs typeface="Helvetica" panose="020B0604020202020204" pitchFamily="34" charset="0"/>
+              </a:rPr>
+              <a:t>Start</a:t>
+            </a:r>
+            <a:r>
+              <a:rPr lang="ja-JP" altLang="en-US" sz="2800" dirty="0">
+                <a:solidFill>
+                  <a:srgbClr val="1F3764"/>
+                </a:solidFill>
+                <a:latin typeface="メイリオ" panose="020B0604030504040204" pitchFamily="50" charset="-128"/>
+                <a:ea typeface="メイリオ" panose="020B0604030504040204" pitchFamily="50" charset="-128"/>
+                <a:cs typeface="Helvetica" panose="020B0604020202020204" pitchFamily="34" charset="0"/>
+              </a:rPr>
+              <a:t>ボタンをタップして開始してください．</a:t>
+            </a:r>
+            <a:endParaRPr lang="en-US" altLang="ja-JP" sz="2800" dirty="0">
+              <a:solidFill>
+                <a:srgbClr val="1F3764"/>
+              </a:solidFill>
+              <a:latin typeface="メイリオ" panose="020B0604030504040204" pitchFamily="50" charset="-128"/>
+              <a:ea typeface="メイリオ" panose="020B0604030504040204" pitchFamily="50" charset="-128"/>
+              <a:cs typeface="Helvetica" panose="020B0604020202020204" pitchFamily="34" charset="0"/>
+            </a:endParaRPr>
+          </a:p>
+        </p:txBody>
+      </p:sp>
+      <p:sp>
+        <p:nvSpPr>
+          <p:cNvPr id="3" name="正方形/長方形 2">
+            <a:extLst>
+              <a:ext uri="{FF2B5EF4-FFF2-40B4-BE49-F238E27FC236}">
+                <a16:creationId xmlns:a16="http://schemas.microsoft.com/office/drawing/2014/main" id="{5D838B32-B0DA-81E6-DBE7-5E4B4C41D601}"/>
+              </a:ext>
+            </a:extLst>
+          </p:cNvPr>
+          <p:cNvSpPr/>
+          <p:nvPr/>
+        </p:nvSpPr>
+        <p:spPr>
+          <a:xfrm>
+            <a:off x="3772056" y="3492194"/>
+            <a:ext cx="4647888" cy="3186757"/>
+          </a:xfrm>
+          <a:prstGeom prst="rect">
+            <a:avLst/>
+          </a:prstGeom>
+          <a:solidFill>
+            <a:schemeClr val="tx1"/>
+          </a:solidFill>
+          <a:ln>
+            <a:solidFill>
+              <a:schemeClr val="tx1"/>
+            </a:solidFill>
+          </a:ln>
+        </p:spPr>
+        <p:style>
+          <a:lnRef idx="2">
+            <a:schemeClr val="accent1">
+              <a:shade val="15000"/>
+            </a:schemeClr>
+          </a:lnRef>
+          <a:fillRef idx="1">
+            <a:schemeClr val="accent1"/>
+          </a:fillRef>
+          <a:effectRef idx="0">
+            <a:schemeClr val="accent1"/>
+          </a:effectRef>
+          <a:fontRef idx="minor">
+            <a:schemeClr val="lt1"/>
+          </a:fontRef>
+        </p:style>
+        <p:txBody>
+          <a:bodyPr rtlCol="0" anchor="ctr"/>
+          <a:lstStyle/>
+          <a:p>
+            <a:pPr algn="ctr"/>
+            <a:endParaRPr kumimoji="1" lang="ja-JP" altLang="en-US"/>
+          </a:p>
+        </p:txBody>
+      </p:sp>
+      <p:grpSp>
+        <p:nvGrpSpPr>
+          <p:cNvPr id="12" name="グループ化 11">
+            <a:extLst>
+              <a:ext uri="{FF2B5EF4-FFF2-40B4-BE49-F238E27FC236}">
+                <a16:creationId xmlns:a16="http://schemas.microsoft.com/office/drawing/2014/main" id="{3374B35A-F727-0677-3A1B-DBCC5528F71B}"/>
+              </a:ext>
+            </a:extLst>
+          </p:cNvPr>
+          <p:cNvGrpSpPr/>
+          <p:nvPr/>
+        </p:nvGrpSpPr>
+        <p:grpSpPr>
+          <a:xfrm>
+            <a:off x="4612870" y="3489553"/>
+            <a:ext cx="2966259" cy="2968028"/>
+            <a:chOff x="4207380" y="3695876"/>
+            <a:chExt cx="2966259" cy="2968028"/>
+          </a:xfrm>
+        </p:grpSpPr>
+        <p:pic>
+          <p:nvPicPr>
+            <p:cNvPr id="5" name="図 4" descr="屋内, 座る, テーブル, 暗い が含まれている画像&#10;&#10;自動的に生成された説明">
+              <a:extLst>
+                <a:ext uri="{FF2B5EF4-FFF2-40B4-BE49-F238E27FC236}">
+                  <a16:creationId xmlns:a16="http://schemas.microsoft.com/office/drawing/2014/main" id="{B78904DB-0EEC-18EF-4EF6-16D4133A283E}"/>
+                </a:ext>
+              </a:extLst>
+            </p:cNvPr>
+            <p:cNvPicPr>
+              <a:picLocks noChangeAspect="1"/>
+            </p:cNvPicPr>
+            <p:nvPr/>
+          </p:nvPicPr>
+          <p:blipFill>
+            <a:blip r:embed="rId2">
+              <a:extLst>
+                <a:ext uri="{28A0092B-C50C-407E-A947-70E740481C1C}">
+                  <a14:useLocalDpi xmlns:a14="http://schemas.microsoft.com/office/drawing/2010/main" val="0"/>
+                </a:ext>
+              </a:extLst>
+            </a:blip>
+            <a:stretch>
+              <a:fillRect/>
+            </a:stretch>
+          </p:blipFill>
+          <p:spPr>
+            <a:xfrm>
+              <a:off x="5733639" y="5223904"/>
+              <a:ext cx="1440000" cy="1440000"/>
+            </a:xfrm>
+            <a:prstGeom prst="rect">
+              <a:avLst/>
+            </a:prstGeom>
+          </p:spPr>
+        </p:pic>
+        <p:pic>
+          <p:nvPicPr>
+            <p:cNvPr id="6" name="図 5" descr="屋内, テーブル, 座る, 皿 が含まれている画像&#10;&#10;自動的に生成された説明">
+              <a:extLst>
+                <a:ext uri="{FF2B5EF4-FFF2-40B4-BE49-F238E27FC236}">
+                  <a16:creationId xmlns:a16="http://schemas.microsoft.com/office/drawing/2014/main" id="{B0A275B7-7E29-2B4C-62F7-FC5AC3AA9002}"/>
+                </a:ext>
+              </a:extLst>
+            </p:cNvPr>
+            <p:cNvPicPr>
+              <a:picLocks noChangeAspect="1"/>
+            </p:cNvPicPr>
+            <p:nvPr/>
+          </p:nvPicPr>
+          <p:blipFill>
+            <a:blip r:embed="rId3">
+              <a:extLst>
+                <a:ext uri="{28A0092B-C50C-407E-A947-70E740481C1C}">
+                  <a14:useLocalDpi xmlns:a14="http://schemas.microsoft.com/office/drawing/2010/main" val="0"/>
+                </a:ext>
+              </a:extLst>
+            </a:blip>
+            <a:stretch>
+              <a:fillRect/>
+            </a:stretch>
+          </p:blipFill>
+          <p:spPr>
+            <a:xfrm>
+              <a:off x="4207380" y="5223904"/>
+              <a:ext cx="1440000" cy="1440000"/>
+            </a:xfrm>
+            <a:prstGeom prst="rect">
+              <a:avLst/>
+            </a:prstGeom>
+          </p:spPr>
+        </p:pic>
+        <p:pic>
+          <p:nvPicPr>
+            <p:cNvPr id="8" name="図 7" descr="屋内, テーブル, 座る, 暗い が含まれている画像&#10;&#10;自動的に生成された説明">
+              <a:extLst>
+                <a:ext uri="{FF2B5EF4-FFF2-40B4-BE49-F238E27FC236}">
+                  <a16:creationId xmlns:a16="http://schemas.microsoft.com/office/drawing/2014/main" id="{62AC33AB-B0E4-2467-4688-8059C72D7D91}"/>
+                </a:ext>
+              </a:extLst>
+            </p:cNvPr>
+            <p:cNvPicPr>
+              <a:picLocks noChangeAspect="1"/>
+            </p:cNvPicPr>
+            <p:nvPr/>
+          </p:nvPicPr>
+          <p:blipFill>
+            <a:blip r:embed="rId4">
+              <a:extLst>
+                <a:ext uri="{28A0092B-C50C-407E-A947-70E740481C1C}">
+                  <a14:useLocalDpi xmlns:a14="http://schemas.microsoft.com/office/drawing/2010/main" val="0"/>
+                </a:ext>
+              </a:extLst>
+            </a:blip>
+            <a:stretch>
+              <a:fillRect/>
+            </a:stretch>
+          </p:blipFill>
+          <p:spPr>
+            <a:xfrm>
+              <a:off x="4207380" y="3695876"/>
+              <a:ext cx="1440000" cy="1440000"/>
+            </a:xfrm>
+            <a:prstGeom prst="rect">
+              <a:avLst/>
+            </a:prstGeom>
+          </p:spPr>
+        </p:pic>
+        <p:pic>
+          <p:nvPicPr>
+            <p:cNvPr id="11" name="図 10" descr="屋内, 座る, テーブル, 暗い が含まれている画像&#10;&#10;自動的に生成された説明">
+              <a:extLst>
+                <a:ext uri="{FF2B5EF4-FFF2-40B4-BE49-F238E27FC236}">
+                  <a16:creationId xmlns:a16="http://schemas.microsoft.com/office/drawing/2014/main" id="{FF7C9C15-29D2-3778-FF2B-5C35820A0B09}"/>
+                </a:ext>
+              </a:extLst>
+            </p:cNvPr>
+            <p:cNvPicPr>
+              <a:picLocks noChangeAspect="1"/>
+            </p:cNvPicPr>
+            <p:nvPr/>
+          </p:nvPicPr>
+          <p:blipFill>
+            <a:blip r:embed="rId5">
+              <a:extLst>
+                <a:ext uri="{28A0092B-C50C-407E-A947-70E740481C1C}">
+                  <a14:useLocalDpi xmlns:a14="http://schemas.microsoft.com/office/drawing/2010/main" val="0"/>
+                </a:ext>
+              </a:extLst>
+            </a:blip>
+            <a:stretch>
+              <a:fillRect/>
+            </a:stretch>
+          </p:blipFill>
+          <p:spPr>
+            <a:xfrm>
+              <a:off x="5733639" y="3695876"/>
+              <a:ext cx="1440000" cy="1440000"/>
+            </a:xfrm>
+            <a:prstGeom prst="rect">
+              <a:avLst/>
+            </a:prstGeom>
+          </p:spPr>
+        </p:pic>
+      </p:grpSp>
+    </p:spTree>
+    <p:extLst>
+      <p:ext uri="{BB962C8B-B14F-4D97-AF65-F5344CB8AC3E}">
+        <p14:creationId xmlns:p14="http://schemas.microsoft.com/office/powerpoint/2010/main" val="4170440838"/>
       </p:ext>
     </p:extLst>
   </p:cSld>

</xml_diff>